<commit_message>
document si prezentare finalizate
</commit_message>
<xml_diff>
--- a/X-O Minimax 1.pptx
+++ b/X-O Minimax 1.pptx
@@ -110,6 +110,11 @@
       </a:defRPr>
     </a:lvl9pPr>
   </p:defaultTextStyle>
+  <p:extLst>
+    <p:ext uri="{EFAFB233-063F-42B5-8137-9DF3F51BA10A}">
+      <p15:sldGuideLst xmlns:p15="http://schemas.microsoft.com/office/powerpoint/2012/main"/>
+    </p:ext>
+  </p:extLst>
 </p:presentation>
 </file>
 
@@ -244,7 +249,7 @@
           <a:p>
             <a:fld id="{E56A6D79-342E-475B-88AC-9E690B60B5E5}" type="datetimeFigureOut">
               <a:rPr lang="ro-RO" smtClean="0"/>
-              <a:t>29.12.2020</a:t>
+              <a:t>02.01.2021</a:t>
             </a:fld>
             <a:endParaRPr lang="ro-RO"/>
           </a:p>
@@ -414,7 +419,7 @@
           <a:p>
             <a:fld id="{E56A6D79-342E-475B-88AC-9E690B60B5E5}" type="datetimeFigureOut">
               <a:rPr lang="ro-RO" smtClean="0"/>
-              <a:t>30.12.2020</a:t>
+              <a:t>02.01.2021</a:t>
             </a:fld>
             <a:endParaRPr lang="ro-RO"/>
           </a:p>
@@ -594,7 +599,7 @@
           <a:p>
             <a:fld id="{E56A6D79-342E-475B-88AC-9E690B60B5E5}" type="datetimeFigureOut">
               <a:rPr lang="ro-RO" smtClean="0"/>
-              <a:t>30.12.2020</a:t>
+              <a:t>02.01.2021</a:t>
             </a:fld>
             <a:endParaRPr lang="ro-RO"/>
           </a:p>
@@ -764,7 +769,7 @@
           <a:p>
             <a:fld id="{E56A6D79-342E-475B-88AC-9E690B60B5E5}" type="datetimeFigureOut">
               <a:rPr lang="ro-RO" smtClean="0"/>
-              <a:t>30.12.2020</a:t>
+              <a:t>02.01.2021</a:t>
             </a:fld>
             <a:endParaRPr lang="ro-RO"/>
           </a:p>
@@ -1010,7 +1015,7 @@
           <a:p>
             <a:fld id="{E56A6D79-342E-475B-88AC-9E690B60B5E5}" type="datetimeFigureOut">
               <a:rPr lang="ro-RO" smtClean="0"/>
-              <a:t>30.12.2020</a:t>
+              <a:t>02.01.2021</a:t>
             </a:fld>
             <a:endParaRPr lang="ro-RO"/>
           </a:p>
@@ -1242,7 +1247,7 @@
           <a:p>
             <a:fld id="{E56A6D79-342E-475B-88AC-9E690B60B5E5}" type="datetimeFigureOut">
               <a:rPr lang="ro-RO" smtClean="0"/>
-              <a:t>30.12.2020</a:t>
+              <a:t>02.01.2021</a:t>
             </a:fld>
             <a:endParaRPr lang="ro-RO"/>
           </a:p>
@@ -1609,7 +1614,7 @@
           <a:p>
             <a:fld id="{E56A6D79-342E-475B-88AC-9E690B60B5E5}" type="datetimeFigureOut">
               <a:rPr lang="ro-RO" smtClean="0"/>
-              <a:t>30.12.2020</a:t>
+              <a:t>02.01.2021</a:t>
             </a:fld>
             <a:endParaRPr lang="ro-RO"/>
           </a:p>
@@ -1727,7 +1732,7 @@
           <a:p>
             <a:fld id="{E56A6D79-342E-475B-88AC-9E690B60B5E5}" type="datetimeFigureOut">
               <a:rPr lang="ro-RO" smtClean="0"/>
-              <a:t>30.12.2020</a:t>
+              <a:t>02.01.2021</a:t>
             </a:fld>
             <a:endParaRPr lang="ro-RO"/>
           </a:p>
@@ -1822,7 +1827,7 @@
           <a:p>
             <a:fld id="{E56A6D79-342E-475B-88AC-9E690B60B5E5}" type="datetimeFigureOut">
               <a:rPr lang="ro-RO" smtClean="0"/>
-              <a:t>30.12.2020</a:t>
+              <a:t>02.01.2021</a:t>
             </a:fld>
             <a:endParaRPr lang="ro-RO"/>
           </a:p>
@@ -2099,7 +2104,7 @@
           <a:p>
             <a:fld id="{E56A6D79-342E-475B-88AC-9E690B60B5E5}" type="datetimeFigureOut">
               <a:rPr lang="ro-RO" smtClean="0"/>
-              <a:t>30.12.2020</a:t>
+              <a:t>02.01.2021</a:t>
             </a:fld>
             <a:endParaRPr lang="ro-RO"/>
           </a:p>
@@ -2352,7 +2357,7 @@
           <a:p>
             <a:fld id="{E56A6D79-342E-475B-88AC-9E690B60B5E5}" type="datetimeFigureOut">
               <a:rPr lang="ro-RO" smtClean="0"/>
-              <a:t>30.12.2020</a:t>
+              <a:t>02.01.2021</a:t>
             </a:fld>
             <a:endParaRPr lang="ro-RO"/>
           </a:p>
@@ -2565,7 +2570,7 @@
           <a:p>
             <a:fld id="{E56A6D79-342E-475B-88AC-9E690B60B5E5}" type="datetimeFigureOut">
               <a:rPr lang="ro-RO" smtClean="0"/>
-              <a:t>29.12.2020</a:t>
+              <a:t>02.01.2021</a:t>
             </a:fld>
             <a:endParaRPr lang="ro-RO"/>
           </a:p>
@@ -3129,20 +3134,8 @@
           <a:lstStyle/>
           <a:p>
             <a:r>
-              <a:rPr lang="en-US" b="1" dirty="0" err="1" smtClean="0"/>
-              <a:t>Algoritmul</a:t>
-            </a:r>
-            <a:r>
               <a:rPr lang="en-US" b="1" dirty="0" smtClean="0"/>
-              <a:t> </a:t>
-            </a:r>
-            <a:r>
-              <a:rPr lang="en-US" b="1" dirty="0" err="1" smtClean="0"/>
-              <a:t>Minimax</a:t>
-            </a:r>
-            <a:r>
-              <a:rPr lang="en-US" b="1" dirty="0" smtClean="0"/>
-              <a:t> </a:t>
+              <a:t>Algoritmul Minimax </a:t>
             </a:r>
             <a:r>
               <a:rPr lang="ro-RO" b="1" dirty="0" smtClean="0"/>
@@ -3182,7 +3175,27 @@
             </a:r>
             <a:r>
               <a:rPr lang="ro-RO" dirty="0" smtClean="0"/>
-              <a:t> în jocurile cu doi jucători, vom presupune că X este un jucător de maximizare și O este un jucător de minimizare.</a:t>
+              <a:t> în </a:t>
+            </a:r>
+            <a:r>
+              <a:rPr lang="en-US" dirty="0" err="1" smtClean="0"/>
+              <a:t>acest</a:t>
+            </a:r>
+            <a:r>
+              <a:rPr lang="en-US" dirty="0" smtClean="0"/>
+              <a:t> </a:t>
+            </a:r>
+            <a:r>
+              <a:rPr lang="en-US" dirty="0" err="1" smtClean="0"/>
+              <a:t>joc</a:t>
+            </a:r>
+            <a:r>
+              <a:rPr lang="ro-RO" dirty="0" smtClean="0"/>
+              <a:t>, </a:t>
+            </a:r>
+            <a:r>
+              <a:rPr lang="ro-RO" dirty="0" smtClean="0"/>
+              <a:t>vom presupune că X este un jucător de maximizare și O este un jucător de minimizare.</a:t>
             </a:r>
           </a:p>
           <a:p>
@@ -3234,7 +3247,23 @@
             </a:r>
             <a:r>
               <a:rPr lang="ro-RO" sz="2800" dirty="0" smtClean="0"/>
-              <a:t>: va returna-100;</a:t>
+              <a:t>: va </a:t>
+            </a:r>
+            <a:r>
+              <a:rPr lang="ro-RO" sz="2800" dirty="0" smtClean="0"/>
+              <a:t>returna</a:t>
+            </a:r>
+            <a:r>
+              <a:rPr lang="en-US" sz="2800" dirty="0" smtClean="0"/>
+              <a:t> </a:t>
+            </a:r>
+            <a:r>
+              <a:rPr lang="ro-RO" sz="2800" dirty="0" smtClean="0"/>
+              <a:t>-</a:t>
+            </a:r>
+            <a:r>
+              <a:rPr lang="ro-RO" sz="2800" dirty="0" smtClean="0"/>
+              <a:t>100;</a:t>
             </a:r>
             <a:endParaRPr lang="ro-RO" sz="2800" dirty="0"/>
           </a:p>
@@ -4187,10 +4216,52 @@
           <a:bodyPr/>
           <a:lstStyle/>
           <a:p>
-            <a:endParaRPr lang="ro-RO"/>
-          </a:p>
-        </p:txBody>
-      </p:sp>
+            <a:r>
+              <a:rPr lang="ro-RO" dirty="0" smtClean="0"/>
+              <a:t>Aplicația a fost implementată în limbajul </a:t>
+            </a:r>
+            <a:r>
+              <a:rPr lang="ro-RO" dirty="0" err="1" smtClean="0"/>
+              <a:t>JavaScript</a:t>
+            </a:r>
+            <a:r>
+              <a:rPr lang="ro-RO" dirty="0" smtClean="0"/>
+              <a:t> urmând pseudocodul algoritmului </a:t>
+            </a:r>
+            <a:r>
+              <a:rPr lang="ro-RO" dirty="0" err="1" smtClean="0"/>
+              <a:t>minimax</a:t>
+            </a:r>
+            <a:r>
+              <a:rPr lang="ro-RO" dirty="0" smtClean="0"/>
+              <a:t>.</a:t>
+            </a:r>
+            <a:endParaRPr lang="ro-RO" dirty="0"/>
+          </a:p>
+        </p:txBody>
+      </p:sp>
+      <p:pic>
+        <p:nvPicPr>
+          <p:cNvPr id="4" name="Imagine 3"/>
+          <p:cNvPicPr/>
+          <p:nvPr/>
+        </p:nvPicPr>
+        <p:blipFill>
+          <a:blip r:embed="rId2"/>
+          <a:stretch>
+            <a:fillRect/>
+          </a:stretch>
+        </p:blipFill>
+        <p:spPr>
+          <a:xfrm>
+            <a:off x="2943224" y="2933700"/>
+            <a:ext cx="5997576" cy="2832100"/>
+          </a:xfrm>
+          <a:prstGeom prst="rect">
+            <a:avLst/>
+          </a:prstGeom>
+        </p:spPr>
+      </p:pic>
     </p:spTree>
     <p:extLst>
       <p:ext uri="{BB962C8B-B14F-4D97-AF65-F5344CB8AC3E}">

</xml_diff>